<commit_message>
Preliminary finish the structure
</commit_message>
<xml_diff>
--- a/ReadMe.pptx
+++ b/ReadMe.pptx
@@ -3486,7 +3486,7 @@
         </p:nvSpPr>
         <p:spPr>
           <a:xfrm>
-            <a:off x="4955937" y="2124267"/>
+            <a:off x="4966441" y="1702014"/>
             <a:ext cx="1010755" cy="369332"/>
           </a:xfrm>
           <a:prstGeom prst="rect">
@@ -3523,8 +3523,8 @@
         </p:nvCxnSpPr>
         <p:spPr>
           <a:xfrm flipH="1">
-            <a:off x="3358257" y="2301081"/>
-            <a:ext cx="1464278" cy="15705"/>
+            <a:off x="3358257" y="1979720"/>
+            <a:ext cx="1525028" cy="337066"/>
           </a:xfrm>
           <a:prstGeom prst="straightConnector1">
             <a:avLst/>
@@ -3598,7 +3598,7 @@
         </p:nvSpPr>
         <p:spPr>
           <a:xfrm>
-            <a:off x="3850039" y="2018440"/>
+            <a:off x="3689613" y="1809736"/>
             <a:ext cx="945472" cy="261610"/>
           </a:xfrm>
           <a:prstGeom prst="rect">
@@ -3656,6 +3656,271 @@
               <a:t>Directory_mapper_invest.m</a:t>
             </a:r>
             <a:endParaRPr lang="en-US" dirty="0"/>
+          </a:p>
+        </p:txBody>
+      </p:sp>
+      <p:sp>
+        <p:nvSpPr>
+          <p:cNvPr id="15" name="TextBox 14">
+            <a:extLst>
+              <a:ext uri="{FF2B5EF4-FFF2-40B4-BE49-F238E27FC236}">
+                <a16:creationId xmlns:a16="http://schemas.microsoft.com/office/drawing/2014/main" id="{C6015EAF-B418-0F5A-5D08-35480FD7D8E5}"/>
+              </a:ext>
+            </a:extLst>
+          </p:cNvPr>
+          <p:cNvSpPr txBox="1"/>
+          <p:nvPr/>
+        </p:nvSpPr>
+        <p:spPr>
+          <a:xfrm>
+            <a:off x="4966440" y="2451497"/>
+            <a:ext cx="1570547" cy="369332"/>
+          </a:xfrm>
+          <a:prstGeom prst="rect">
+            <a:avLst/>
+          </a:prstGeom>
+          <a:noFill/>
+        </p:spPr>
+        <p:txBody>
+          <a:bodyPr wrap="square" rtlCol="0">
+            <a:spAutoFit/>
+          </a:bodyPr>
+          <a:lstStyle/>
+          <a:p>
+            <a:r>
+              <a:rPr lang="en-US" dirty="0" err="1"/>
+              <a:t>Cluster_linker</a:t>
+            </a:r>
+            <a:endParaRPr lang="en-US" dirty="0"/>
+          </a:p>
+        </p:txBody>
+      </p:sp>
+      <p:cxnSp>
+        <p:nvCxnSpPr>
+          <p:cNvPr id="17" name="Straight Arrow Connector 16">
+            <a:extLst>
+              <a:ext uri="{FF2B5EF4-FFF2-40B4-BE49-F238E27FC236}">
+                <a16:creationId xmlns:a16="http://schemas.microsoft.com/office/drawing/2014/main" id="{26861A94-F8DE-B59E-586A-715F130035B4}"/>
+              </a:ext>
+            </a:extLst>
+          </p:cNvPr>
+          <p:cNvCxnSpPr>
+            <a:cxnSpLocks/>
+            <a:stCxn id="15" idx="1"/>
+          </p:cNvCxnSpPr>
+          <p:nvPr/>
+        </p:nvCxnSpPr>
+        <p:spPr>
+          <a:xfrm flipH="1" flipV="1">
+            <a:off x="3395893" y="2316786"/>
+            <a:ext cx="1570547" cy="319377"/>
+          </a:xfrm>
+          <a:prstGeom prst="straightConnector1">
+            <a:avLst/>
+          </a:prstGeom>
+          <a:ln w="38100">
+            <a:tailEnd type="triangle"/>
+          </a:ln>
+        </p:spPr>
+        <p:style>
+          <a:lnRef idx="1">
+            <a:schemeClr val="accent1"/>
+          </a:lnRef>
+          <a:fillRef idx="0">
+            <a:schemeClr val="accent1"/>
+          </a:fillRef>
+          <a:effectRef idx="0">
+            <a:schemeClr val="accent1"/>
+          </a:effectRef>
+          <a:fontRef idx="minor">
+            <a:schemeClr val="tx1"/>
+          </a:fontRef>
+        </p:style>
+      </p:cxnSp>
+      <p:sp>
+        <p:nvSpPr>
+          <p:cNvPr id="21" name="TextBox 20">
+            <a:extLst>
+              <a:ext uri="{FF2B5EF4-FFF2-40B4-BE49-F238E27FC236}">
+                <a16:creationId xmlns:a16="http://schemas.microsoft.com/office/drawing/2014/main" id="{1992BDF5-E5F1-057D-94ED-59151807BDE6}"/>
+              </a:ext>
+            </a:extLst>
+          </p:cNvPr>
+          <p:cNvSpPr txBox="1"/>
+          <p:nvPr/>
+        </p:nvSpPr>
+        <p:spPr>
+          <a:xfrm>
+            <a:off x="4181166" y="2815580"/>
+            <a:ext cx="3048811" cy="369332"/>
+          </a:xfrm>
+          <a:prstGeom prst="rect">
+            <a:avLst/>
+          </a:prstGeom>
+          <a:noFill/>
+        </p:spPr>
+        <p:txBody>
+          <a:bodyPr wrap="square">
+            <a:spAutoFit/>
+          </a:bodyPr>
+          <a:lstStyle/>
+          <a:p>
+            <a:r>
+              <a:rPr lang="en-US" dirty="0"/>
+              <a:t>Script: </a:t>
+            </a:r>
+            <a:r>
+              <a:rPr lang="en-US" dirty="0" err="1"/>
+              <a:t>Cluster_visualization.m</a:t>
+            </a:r>
+            <a:endParaRPr lang="en-US" dirty="0"/>
+          </a:p>
+        </p:txBody>
+      </p:sp>
+      <p:sp>
+        <p:nvSpPr>
+          <p:cNvPr id="22" name="TextBox 21">
+            <a:extLst>
+              <a:ext uri="{FF2B5EF4-FFF2-40B4-BE49-F238E27FC236}">
+                <a16:creationId xmlns:a16="http://schemas.microsoft.com/office/drawing/2014/main" id="{5EBCC5F8-473C-4D27-50EE-FF8B5D356409}"/>
+              </a:ext>
+            </a:extLst>
+          </p:cNvPr>
+          <p:cNvSpPr txBox="1"/>
+          <p:nvPr/>
+        </p:nvSpPr>
+        <p:spPr>
+          <a:xfrm>
+            <a:off x="2310877" y="4325991"/>
+            <a:ext cx="1570547" cy="369332"/>
+          </a:xfrm>
+          <a:prstGeom prst="rect">
+            <a:avLst/>
+          </a:prstGeom>
+          <a:noFill/>
+        </p:spPr>
+        <p:txBody>
+          <a:bodyPr wrap="square" rtlCol="0">
+            <a:spAutoFit/>
+          </a:bodyPr>
+          <a:lstStyle/>
+          <a:p>
+            <a:r>
+              <a:rPr lang="en-US" dirty="0" err="1"/>
+              <a:t>Cluster_info</a:t>
+            </a:r>
+            <a:endParaRPr lang="en-US" dirty="0"/>
+          </a:p>
+        </p:txBody>
+      </p:sp>
+      <p:sp>
+        <p:nvSpPr>
+          <p:cNvPr id="23" name="TextBox 22">
+            <a:extLst>
+              <a:ext uri="{FF2B5EF4-FFF2-40B4-BE49-F238E27FC236}">
+                <a16:creationId xmlns:a16="http://schemas.microsoft.com/office/drawing/2014/main" id="{2D048281-2C41-6795-0DB6-F9EC4F78153E}"/>
+              </a:ext>
+            </a:extLst>
+          </p:cNvPr>
+          <p:cNvSpPr txBox="1"/>
+          <p:nvPr/>
+        </p:nvSpPr>
+        <p:spPr>
+          <a:xfrm>
+            <a:off x="4040871" y="2250763"/>
+            <a:ext cx="945472" cy="261610"/>
+          </a:xfrm>
+          <a:prstGeom prst="rect">
+            <a:avLst/>
+          </a:prstGeom>
+          <a:noFill/>
+        </p:spPr>
+        <p:txBody>
+          <a:bodyPr wrap="square" rtlCol="0">
+            <a:spAutoFit/>
+          </a:bodyPr>
+          <a:lstStyle/>
+          <a:p>
+            <a:r>
+              <a:rPr lang="en-US" sz="1100" dirty="0"/>
+              <a:t>Property</a:t>
+            </a:r>
+          </a:p>
+        </p:txBody>
+      </p:sp>
+      <p:cxnSp>
+        <p:nvCxnSpPr>
+          <p:cNvPr id="24" name="Straight Arrow Connector 23">
+            <a:extLst>
+              <a:ext uri="{FF2B5EF4-FFF2-40B4-BE49-F238E27FC236}">
+                <a16:creationId xmlns:a16="http://schemas.microsoft.com/office/drawing/2014/main" id="{7D55EC9F-4628-5256-6CC6-452CCD78ED81}"/>
+              </a:ext>
+            </a:extLst>
+          </p:cNvPr>
+          <p:cNvCxnSpPr>
+            <a:cxnSpLocks/>
+          </p:cNvCxnSpPr>
+          <p:nvPr/>
+        </p:nvCxnSpPr>
+        <p:spPr>
+          <a:xfrm>
+            <a:off x="3018407" y="3429000"/>
+            <a:ext cx="0" cy="842818"/>
+          </a:xfrm>
+          <a:prstGeom prst="straightConnector1">
+            <a:avLst/>
+          </a:prstGeom>
+          <a:ln w="38100">
+            <a:tailEnd type="triangle"/>
+          </a:ln>
+        </p:spPr>
+        <p:style>
+          <a:lnRef idx="1">
+            <a:schemeClr val="accent1"/>
+          </a:lnRef>
+          <a:fillRef idx="0">
+            <a:schemeClr val="accent1"/>
+          </a:fillRef>
+          <a:effectRef idx="0">
+            <a:schemeClr val="accent1"/>
+          </a:effectRef>
+          <a:fontRef idx="minor">
+            <a:schemeClr val="tx1"/>
+          </a:fontRef>
+        </p:style>
+      </p:cxnSp>
+      <p:sp>
+        <p:nvSpPr>
+          <p:cNvPr id="27" name="TextBox 26">
+            <a:extLst>
+              <a:ext uri="{FF2B5EF4-FFF2-40B4-BE49-F238E27FC236}">
+                <a16:creationId xmlns:a16="http://schemas.microsoft.com/office/drawing/2014/main" id="{1E6C957E-E032-6035-B00A-DE3A931C444F}"/>
+              </a:ext>
+            </a:extLst>
+          </p:cNvPr>
+          <p:cNvSpPr txBox="1"/>
+          <p:nvPr/>
+        </p:nvSpPr>
+        <p:spPr>
+          <a:xfrm>
+            <a:off x="3018407" y="3641188"/>
+            <a:ext cx="945472" cy="261610"/>
+          </a:xfrm>
+          <a:prstGeom prst="rect">
+            <a:avLst/>
+          </a:prstGeom>
+          <a:noFill/>
+        </p:spPr>
+        <p:txBody>
+          <a:bodyPr wrap="square" rtlCol="0">
+            <a:spAutoFit/>
+          </a:bodyPr>
+          <a:lstStyle/>
+          <a:p>
+            <a:r>
+              <a:rPr lang="en-US" sz="1100" dirty="0"/>
+              <a:t>Extract one</a:t>
+            </a:r>
           </a:p>
         </p:txBody>
       </p:sp>

</xml_diff>